<commit_message>
[FEAT] Added Watermark to poster
</commit_message>
<xml_diff>
--- a/Poster/Poster.pptx
+++ b/Poster/Poster.pptx
@@ -17237,12 +17237,19 @@
           <a:prstGeom prst="rect">
             <a:avLst/>
           </a:prstGeom>
-          <a:solidFill>
-            <a:schemeClr val="accent1">
-              <a:lumMod val="40000"/>
-              <a:lumOff val="60000"/>
-            </a:schemeClr>
-          </a:solidFill>
+          <a:blipFill dpi="0" rotWithShape="1">
+            <a:blip r:embed="rId2">
+              <a:extLst>
+                <a:ext uri="{28A0092B-C50C-407E-A947-70E740481C1C}">
+                  <a14:useLocalDpi xmlns:a14="http://schemas.microsoft.com/office/drawing/2010/main" val="0"/>
+                </a:ext>
+              </a:extLst>
+            </a:blip>
+            <a:srcRect/>
+            <a:stretch>
+              <a:fillRect/>
+            </a:stretch>
+          </a:blipFill>
           <a:ln w="127000">
             <a:solidFill>
               <a:schemeClr val="bg1"/>
@@ -17294,12 +17301,19 @@
           <a:prstGeom prst="rect">
             <a:avLst/>
           </a:prstGeom>
-          <a:solidFill>
-            <a:schemeClr val="accent1">
-              <a:lumMod val="40000"/>
-              <a:lumOff val="60000"/>
-            </a:schemeClr>
-          </a:solidFill>
+          <a:blipFill dpi="0" rotWithShape="1">
+            <a:blip r:embed="rId2">
+              <a:extLst>
+                <a:ext uri="{28A0092B-C50C-407E-A947-70E740481C1C}">
+                  <a14:useLocalDpi xmlns:a14="http://schemas.microsoft.com/office/drawing/2010/main" val="0"/>
+                </a:ext>
+              </a:extLst>
+            </a:blip>
+            <a:srcRect/>
+            <a:stretch>
+              <a:fillRect/>
+            </a:stretch>
+          </a:blipFill>
           <a:ln w="127000">
             <a:solidFill>
               <a:schemeClr val="bg1"/>
@@ -17351,12 +17365,19 @@
           <a:prstGeom prst="rect">
             <a:avLst/>
           </a:prstGeom>
-          <a:solidFill>
-            <a:schemeClr val="accent1">
-              <a:lumMod val="40000"/>
-              <a:lumOff val="60000"/>
-            </a:schemeClr>
-          </a:solidFill>
+          <a:blipFill dpi="0" rotWithShape="1">
+            <a:blip r:embed="rId2">
+              <a:extLst>
+                <a:ext uri="{28A0092B-C50C-407E-A947-70E740481C1C}">
+                  <a14:useLocalDpi xmlns:a14="http://schemas.microsoft.com/office/drawing/2010/main" val="0"/>
+                </a:ext>
+              </a:extLst>
+            </a:blip>
+            <a:srcRect/>
+            <a:stretch>
+              <a:fillRect/>
+            </a:stretch>
+          </a:blipFill>
           <a:ln w="127000">
             <a:solidFill>
               <a:schemeClr val="bg1"/>
@@ -17408,12 +17429,19 @@
           <a:prstGeom prst="rect">
             <a:avLst/>
           </a:prstGeom>
-          <a:solidFill>
-            <a:schemeClr val="accent1">
-              <a:lumMod val="40000"/>
-              <a:lumOff val="60000"/>
-            </a:schemeClr>
-          </a:solidFill>
+          <a:blipFill dpi="0" rotWithShape="1">
+            <a:blip r:embed="rId2">
+              <a:extLst>
+                <a:ext uri="{28A0092B-C50C-407E-A947-70E740481C1C}">
+                  <a14:useLocalDpi xmlns:a14="http://schemas.microsoft.com/office/drawing/2010/main" val="0"/>
+                </a:ext>
+              </a:extLst>
+            </a:blip>
+            <a:srcRect/>
+            <a:stretch>
+              <a:fillRect/>
+            </a:stretch>
+          </a:blipFill>
           <a:ln w="127000">
             <a:solidFill>
               <a:schemeClr val="bg1"/>
@@ -17465,12 +17493,19 @@
           <a:prstGeom prst="rect">
             <a:avLst/>
           </a:prstGeom>
-          <a:solidFill>
-            <a:schemeClr val="accent1">
-              <a:lumMod val="40000"/>
-              <a:lumOff val="60000"/>
-            </a:schemeClr>
-          </a:solidFill>
+          <a:blipFill dpi="0" rotWithShape="1">
+            <a:blip r:embed="rId2">
+              <a:extLst>
+                <a:ext uri="{28A0092B-C50C-407E-A947-70E740481C1C}">
+                  <a14:useLocalDpi xmlns:a14="http://schemas.microsoft.com/office/drawing/2010/main" val="0"/>
+                </a:ext>
+              </a:extLst>
+            </a:blip>
+            <a:srcRect/>
+            <a:stretch>
+              <a:fillRect/>
+            </a:stretch>
+          </a:blipFill>
           <a:ln w="127000">
             <a:solidFill>
               <a:schemeClr val="bg1"/>
@@ -17522,12 +17557,19 @@
           <a:prstGeom prst="rect">
             <a:avLst/>
           </a:prstGeom>
-          <a:solidFill>
-            <a:schemeClr val="accent1">
-              <a:lumMod val="40000"/>
-              <a:lumOff val="60000"/>
-            </a:schemeClr>
-          </a:solidFill>
+          <a:blipFill dpi="0" rotWithShape="1">
+            <a:blip r:embed="rId2">
+              <a:extLst>
+                <a:ext uri="{28A0092B-C50C-407E-A947-70E740481C1C}">
+                  <a14:useLocalDpi xmlns:a14="http://schemas.microsoft.com/office/drawing/2010/main" val="0"/>
+                </a:ext>
+              </a:extLst>
+            </a:blip>
+            <a:srcRect/>
+            <a:stretch>
+              <a:fillRect/>
+            </a:stretch>
+          </a:blipFill>
           <a:ln w="127000">
             <a:solidFill>
               <a:schemeClr val="bg1"/>
@@ -17577,7 +17619,7 @@
           <p:nvPr/>
         </p:nvPicPr>
         <p:blipFill>
-          <a:blip r:embed="rId2">
+          <a:blip r:embed="rId3">
             <a:extLst>
               <a:ext uri="{28A0092B-C50C-407E-A947-70E740481C1C}">
                 <a14:useLocalDpi xmlns:a14="http://schemas.microsoft.com/office/drawing/2010/main" val="0"/>
@@ -17618,12 +17660,19 @@
           <a:prstGeom prst="rect">
             <a:avLst/>
           </a:prstGeom>
-          <a:solidFill>
-            <a:schemeClr val="accent1">
-              <a:lumMod val="40000"/>
-              <a:lumOff val="60000"/>
-            </a:schemeClr>
-          </a:solidFill>
+          <a:blipFill dpi="0" rotWithShape="1">
+            <a:blip r:embed="rId2">
+              <a:extLst>
+                <a:ext uri="{28A0092B-C50C-407E-A947-70E740481C1C}">
+                  <a14:useLocalDpi xmlns:a14="http://schemas.microsoft.com/office/drawing/2010/main" val="0"/>
+                </a:ext>
+              </a:extLst>
+            </a:blip>
+            <a:srcRect/>
+            <a:stretch>
+              <a:fillRect/>
+            </a:stretch>
+          </a:blipFill>
           <a:ln w="127000">
             <a:solidFill>
               <a:schemeClr val="bg1"/>
@@ -17675,12 +17724,19 @@
           <a:prstGeom prst="rect">
             <a:avLst/>
           </a:prstGeom>
-          <a:solidFill>
-            <a:schemeClr val="accent1">
-              <a:lumMod val="40000"/>
-              <a:lumOff val="60000"/>
-            </a:schemeClr>
-          </a:solidFill>
+          <a:blipFill dpi="0" rotWithShape="1">
+            <a:blip r:embed="rId2">
+              <a:extLst>
+                <a:ext uri="{28A0092B-C50C-407E-A947-70E740481C1C}">
+                  <a14:useLocalDpi xmlns:a14="http://schemas.microsoft.com/office/drawing/2010/main" val="0"/>
+                </a:ext>
+              </a:extLst>
+            </a:blip>
+            <a:srcRect/>
+            <a:stretch>
+              <a:fillRect/>
+            </a:stretch>
+          </a:blipFill>
           <a:ln w="127000">
             <a:solidFill>
               <a:schemeClr val="bg1"/>
@@ -17732,12 +17788,19 @@
           <a:prstGeom prst="rect">
             <a:avLst/>
           </a:prstGeom>
-          <a:solidFill>
-            <a:schemeClr val="accent1">
-              <a:lumMod val="40000"/>
-              <a:lumOff val="60000"/>
-            </a:schemeClr>
-          </a:solidFill>
+          <a:blipFill dpi="0" rotWithShape="1">
+            <a:blip r:embed="rId2">
+              <a:extLst>
+                <a:ext uri="{28A0092B-C50C-407E-A947-70E740481C1C}">
+                  <a14:useLocalDpi xmlns:a14="http://schemas.microsoft.com/office/drawing/2010/main" val="0"/>
+                </a:ext>
+              </a:extLst>
+            </a:blip>
+            <a:srcRect/>
+            <a:stretch>
+              <a:fillRect/>
+            </a:stretch>
+          </a:blipFill>
           <a:ln w="127000">
             <a:solidFill>
               <a:schemeClr val="bg1"/>
@@ -18167,7 +18230,7 @@
           <p:nvPr/>
         </p:nvPicPr>
         <p:blipFill>
-          <a:blip r:embed="rId3">
+          <a:blip r:embed="rId4">
             <a:extLst>
               <a:ext uri="{28A0092B-C50C-407E-A947-70E740481C1C}">
                 <a14:useLocalDpi xmlns:a14="http://schemas.microsoft.com/office/drawing/2010/main" val="0"/>
@@ -18245,7 +18308,7 @@
           <p:nvPr/>
         </p:nvPicPr>
         <p:blipFill>
-          <a:blip r:embed="rId4">
+          <a:blip r:embed="rId5">
             <a:extLst>
               <a:ext uri="{28A0092B-C50C-407E-A947-70E740481C1C}">
                 <a14:useLocalDpi xmlns:a14="http://schemas.microsoft.com/office/drawing/2010/main" val="0"/>
@@ -18281,7 +18344,7 @@
           <p:nvPr/>
         </p:nvPicPr>
         <p:blipFill>
-          <a:blip r:embed="rId5">
+          <a:blip r:embed="rId6">
             <a:extLst>
               <a:ext uri="{28A0092B-C50C-407E-A947-70E740481C1C}">
                 <a14:useLocalDpi xmlns:a14="http://schemas.microsoft.com/office/drawing/2010/main" val="0"/>
@@ -18317,7 +18380,7 @@
           <p:nvPr/>
         </p:nvPicPr>
         <p:blipFill>
-          <a:blip r:embed="rId6">
+          <a:blip r:embed="rId7">
             <a:extLst>
               <a:ext uri="{28A0092B-C50C-407E-A947-70E740481C1C}">
                 <a14:useLocalDpi xmlns:a14="http://schemas.microsoft.com/office/drawing/2010/main" val="0"/>
@@ -18353,7 +18416,7 @@
           <p:nvPr/>
         </p:nvPicPr>
         <p:blipFill>
-          <a:blip r:embed="rId7">
+          <a:blip r:embed="rId8">
             <a:extLst>
               <a:ext uri="{28A0092B-C50C-407E-A947-70E740481C1C}">
                 <a14:useLocalDpi xmlns:a14="http://schemas.microsoft.com/office/drawing/2010/main" val="0"/>
@@ -18389,7 +18452,7 @@
           <p:nvPr/>
         </p:nvPicPr>
         <p:blipFill>
-          <a:blip r:embed="rId8">
+          <a:blip r:embed="rId9">
             <a:extLst>
               <a:ext uri="{28A0092B-C50C-407E-A947-70E740481C1C}">
                 <a14:useLocalDpi xmlns:a14="http://schemas.microsoft.com/office/drawing/2010/main" val="0"/>
@@ -18425,7 +18488,7 @@
           <p:nvPr/>
         </p:nvPicPr>
         <p:blipFill>
-          <a:blip r:embed="rId9">
+          <a:blip r:embed="rId10">
             <a:extLst>
               <a:ext uri="{28A0092B-C50C-407E-A947-70E740481C1C}">
                 <a14:useLocalDpi xmlns:a14="http://schemas.microsoft.com/office/drawing/2010/main" val="0"/>
@@ -18438,7 +18501,7 @@
         </p:blipFill>
         <p:spPr>
           <a:xfrm>
-            <a:off x="1389541" y="12804148"/>
+            <a:off x="1315213" y="12784067"/>
             <a:ext cx="5046598" cy="5046598"/>
           </a:xfrm>
           <a:prstGeom prst="rect">
@@ -18632,7 +18695,7 @@
         </p:nvSpPr>
         <p:spPr>
           <a:xfrm>
-            <a:off x="1721443" y="11870403"/>
+            <a:off x="1905411" y="11385615"/>
             <a:ext cx="3155357" cy="984885"/>
           </a:xfrm>
           <a:prstGeom prst="rect">

</xml_diff>

<commit_message>
[FEAT] Make background transparent
</commit_message>
<xml_diff>
--- a/Poster/Poster.pptx
+++ b/Poster/Poster.pptx
@@ -18367,114 +18367,6 @@
       </p:pic>
       <p:pic>
         <p:nvPicPr>
-          <p:cNvPr id="85" name="Picture 84" descr="A black and white icon with a check mark and a person's face&#10;&#10;Description automatically generated with low confidence">
-            <a:extLst>
-              <a:ext uri="{FF2B5EF4-FFF2-40B4-BE49-F238E27FC236}">
-                <a16:creationId xmlns:a16="http://schemas.microsoft.com/office/drawing/2014/main" id="{B56C6B24-6502-4383-CE81-FBC63F539364}"/>
-              </a:ext>
-            </a:extLst>
-          </p:cNvPr>
-          <p:cNvPicPr>
-            <a:picLocks noChangeAspect="1"/>
-          </p:cNvPicPr>
-          <p:nvPr/>
-        </p:nvPicPr>
-        <p:blipFill>
-          <a:blip r:embed="rId7">
-            <a:extLst>
-              <a:ext uri="{28A0092B-C50C-407E-A947-70E740481C1C}">
-                <a14:useLocalDpi xmlns:a14="http://schemas.microsoft.com/office/drawing/2010/main" val="0"/>
-              </a:ext>
-            </a:extLst>
-          </a:blip>
-          <a:stretch>
-            <a:fillRect/>
-          </a:stretch>
-        </p:blipFill>
-        <p:spPr>
-          <a:xfrm>
-            <a:off x="8006333" y="5008486"/>
-            <a:ext cx="5591454" cy="3727636"/>
-          </a:xfrm>
-          <a:prstGeom prst="rect">
-            <a:avLst/>
-          </a:prstGeom>
-        </p:spPr>
-      </p:pic>
-      <p:pic>
-        <p:nvPicPr>
-          <p:cNvPr id="87" name="Picture 86" descr="A picture containing green, graphics, businesscard, font&#10;&#10;Description automatically generated">
-            <a:extLst>
-              <a:ext uri="{FF2B5EF4-FFF2-40B4-BE49-F238E27FC236}">
-                <a16:creationId xmlns:a16="http://schemas.microsoft.com/office/drawing/2014/main" id="{3367937A-DCDA-3B90-462D-5F61298A67CB}"/>
-              </a:ext>
-            </a:extLst>
-          </p:cNvPr>
-          <p:cNvPicPr>
-            <a:picLocks noChangeAspect="1"/>
-          </p:cNvPicPr>
-          <p:nvPr/>
-        </p:nvPicPr>
-        <p:blipFill>
-          <a:blip r:embed="rId8">
-            <a:extLst>
-              <a:ext uri="{28A0092B-C50C-407E-A947-70E740481C1C}">
-                <a14:useLocalDpi xmlns:a14="http://schemas.microsoft.com/office/drawing/2010/main" val="0"/>
-              </a:ext>
-            </a:extLst>
-          </a:blip>
-          <a:stretch>
-            <a:fillRect/>
-          </a:stretch>
-        </p:blipFill>
-        <p:spPr>
-          <a:xfrm>
-            <a:off x="1225924" y="22388667"/>
-            <a:ext cx="4837563" cy="3763174"/>
-          </a:xfrm>
-          <a:prstGeom prst="rect">
-            <a:avLst/>
-          </a:prstGeom>
-        </p:spPr>
-      </p:pic>
-      <p:pic>
-        <p:nvPicPr>
-          <p:cNvPr id="89" name="Picture 88" descr="A group of people crossing a street&#10;&#10;Description automatically generated with low confidence">
-            <a:extLst>
-              <a:ext uri="{FF2B5EF4-FFF2-40B4-BE49-F238E27FC236}">
-                <a16:creationId xmlns:a16="http://schemas.microsoft.com/office/drawing/2014/main" id="{585E80FB-690B-BF93-B173-165281F176EC}"/>
-              </a:ext>
-            </a:extLst>
-          </p:cNvPr>
-          <p:cNvPicPr>
-            <a:picLocks noChangeAspect="1"/>
-          </p:cNvPicPr>
-          <p:nvPr/>
-        </p:nvPicPr>
-        <p:blipFill>
-          <a:blip r:embed="rId9">
-            <a:extLst>
-              <a:ext uri="{28A0092B-C50C-407E-A947-70E740481C1C}">
-                <a14:useLocalDpi xmlns:a14="http://schemas.microsoft.com/office/drawing/2010/main" val="0"/>
-              </a:ext>
-            </a:extLst>
-          </a:blip>
-          <a:stretch>
-            <a:fillRect/>
-          </a:stretch>
-        </p:blipFill>
-        <p:spPr>
-          <a:xfrm>
-            <a:off x="748418" y="4495798"/>
-            <a:ext cx="5853557" cy="4479889"/>
-          </a:xfrm>
-          <a:prstGeom prst="rect">
-            <a:avLst/>
-          </a:prstGeom>
-        </p:spPr>
-      </p:pic>
-      <p:pic>
-        <p:nvPicPr>
           <p:cNvPr id="91" name="Picture 90" descr="A picture containing black, darkness&#10;&#10;Description automatically generated">
             <a:extLst>
               <a:ext uri="{FF2B5EF4-FFF2-40B4-BE49-F238E27FC236}">
@@ -18488,7 +18380,7 @@
           <p:nvPr/>
         </p:nvPicPr>
         <p:blipFill>
-          <a:blip r:embed="rId10">
+          <a:blip r:embed="rId7">
             <a:extLst>
               <a:ext uri="{28A0092B-C50C-407E-A947-70E740481C1C}">
                 <a14:useLocalDpi xmlns:a14="http://schemas.microsoft.com/office/drawing/2010/main" val="0"/>
@@ -18724,6 +18616,114 @@
           </a:p>
         </p:txBody>
       </p:sp>
+      <p:pic>
+        <p:nvPicPr>
+          <p:cNvPr id="3" name="Picture 2" descr="A group of people crossing a street&#10;&#10;Description automatically generated with low confidence">
+            <a:extLst>
+              <a:ext uri="{FF2B5EF4-FFF2-40B4-BE49-F238E27FC236}">
+                <a16:creationId xmlns:a16="http://schemas.microsoft.com/office/drawing/2014/main" id="{B2D8B63F-E2B5-06A9-5331-0D3EE7F2F030}"/>
+              </a:ext>
+            </a:extLst>
+          </p:cNvPr>
+          <p:cNvPicPr>
+            <a:picLocks noChangeAspect="1"/>
+          </p:cNvPicPr>
+          <p:nvPr/>
+        </p:nvPicPr>
+        <p:blipFill>
+          <a:blip r:embed="rId8">
+            <a:extLst>
+              <a:ext uri="{28A0092B-C50C-407E-A947-70E740481C1C}">
+                <a14:useLocalDpi xmlns:a14="http://schemas.microsoft.com/office/drawing/2010/main" val="0"/>
+              </a:ext>
+            </a:extLst>
+          </a:blip>
+          <a:stretch>
+            <a:fillRect/>
+          </a:stretch>
+        </p:blipFill>
+        <p:spPr>
+          <a:xfrm>
+            <a:off x="563923" y="4277292"/>
+            <a:ext cx="6161565" cy="4715615"/>
+          </a:xfrm>
+          <a:prstGeom prst="rect">
+            <a:avLst/>
+          </a:prstGeom>
+        </p:spPr>
+      </p:pic>
+      <p:pic>
+        <p:nvPicPr>
+          <p:cNvPr id="5" name="Picture 4" descr="A picture containing graphics, cartoon, clipart, screenshot&#10;&#10;Description automatically generated">
+            <a:extLst>
+              <a:ext uri="{FF2B5EF4-FFF2-40B4-BE49-F238E27FC236}">
+                <a16:creationId xmlns:a16="http://schemas.microsoft.com/office/drawing/2014/main" id="{4A65001E-1F88-0806-B9C8-F5213A72286F}"/>
+              </a:ext>
+            </a:extLst>
+          </p:cNvPr>
+          <p:cNvPicPr>
+            <a:picLocks noChangeAspect="1"/>
+          </p:cNvPicPr>
+          <p:nvPr/>
+        </p:nvPicPr>
+        <p:blipFill>
+          <a:blip r:embed="rId9">
+            <a:extLst>
+              <a:ext uri="{28A0092B-C50C-407E-A947-70E740481C1C}">
+                <a14:useLocalDpi xmlns:a14="http://schemas.microsoft.com/office/drawing/2010/main" val="0"/>
+              </a:ext>
+            </a:extLst>
+          </a:blip>
+          <a:stretch>
+            <a:fillRect/>
+          </a:stretch>
+        </p:blipFill>
+        <p:spPr>
+          <a:xfrm>
+            <a:off x="7146643" y="3676079"/>
+            <a:ext cx="6897857" cy="4598571"/>
+          </a:xfrm>
+          <a:prstGeom prst="rect">
+            <a:avLst/>
+          </a:prstGeom>
+        </p:spPr>
+      </p:pic>
+      <p:pic>
+        <p:nvPicPr>
+          <p:cNvPr id="10" name="Picture 9" descr="A picture containing green, graphics, businesscard, screenshot&#10;&#10;Description automatically generated">
+            <a:extLst>
+              <a:ext uri="{FF2B5EF4-FFF2-40B4-BE49-F238E27FC236}">
+                <a16:creationId xmlns:a16="http://schemas.microsoft.com/office/drawing/2014/main" id="{6CA3DEBB-8D88-8B53-535B-11AD837D20CE}"/>
+              </a:ext>
+            </a:extLst>
+          </p:cNvPr>
+          <p:cNvPicPr>
+            <a:picLocks noChangeAspect="1"/>
+          </p:cNvPicPr>
+          <p:nvPr/>
+        </p:nvPicPr>
+        <p:blipFill>
+          <a:blip r:embed="rId10">
+            <a:extLst>
+              <a:ext uri="{28A0092B-C50C-407E-A947-70E740481C1C}">
+                <a14:useLocalDpi xmlns:a14="http://schemas.microsoft.com/office/drawing/2010/main" val="0"/>
+              </a:ext>
+            </a:extLst>
+          </a:blip>
+          <a:stretch>
+            <a:fillRect/>
+          </a:stretch>
+        </p:blipFill>
+        <p:spPr>
+          <a:xfrm>
+            <a:off x="787514" y="22077994"/>
+            <a:ext cx="5391150" cy="4191000"/>
+          </a:xfrm>
+          <a:prstGeom prst="rect">
+            <a:avLst/>
+          </a:prstGeom>
+        </p:spPr>
+      </p:pic>
     </p:spTree>
     <p:extLst>
       <p:ext uri="{BB962C8B-B14F-4D97-AF65-F5344CB8AC3E}">

</xml_diff>